<commit_message>
Update generate command docs for DeveloperGuide
Updated SequenceDiagramforGenerate
Added SDforGenerateCommandLogicAndModel
</commit_message>
<xml_diff>
--- a/docs/diagrams/HighLevelSequenceDiagramsGenerate.pptx
+++ b/docs/diagrams/HighLevelSequenceDiagramsGenerate.pptx
@@ -208,7 +208,7 @@
           <a:p>
             <a:fld id="{F5CC4B3F-88C1-4FFA-B1B6-F41C21DC6924}" type="datetimeFigureOut">
               <a:rPr lang="en-US" smtClean="0"/>
-              <a:t>10/16/18</a:t>
+              <a:t>10/30/18</a:t>
             </a:fld>
             <a:endParaRPr lang="en-US"/>
           </a:p>
@@ -272,38 +272,37 @@
           <a:p>
             <a:pPr lvl="0"/>
             <a:r>
-              <a:rPr lang="en-US" smtClean="0"/>
+              <a:rPr lang="en-US"/>
               <a:t>Click to edit Master text styles</a:t>
             </a:r>
           </a:p>
           <a:p>
             <a:pPr lvl="1"/>
             <a:r>
-              <a:rPr lang="en-US" smtClean="0"/>
+              <a:rPr lang="en-US"/>
               <a:t>Second level</a:t>
             </a:r>
           </a:p>
           <a:p>
             <a:pPr lvl="2"/>
             <a:r>
-              <a:rPr lang="en-US" smtClean="0"/>
+              <a:rPr lang="en-US"/>
               <a:t>Third level</a:t>
             </a:r>
           </a:p>
           <a:p>
             <a:pPr lvl="3"/>
             <a:r>
-              <a:rPr lang="en-US" smtClean="0"/>
+              <a:rPr lang="en-US"/>
               <a:t>Fourth level</a:t>
             </a:r>
           </a:p>
           <a:p>
             <a:pPr lvl="4"/>
             <a:r>
-              <a:rPr lang="en-US" smtClean="0"/>
+              <a:rPr lang="en-US"/>
               <a:t>Fifth level</a:t>
             </a:r>
-            <a:endParaRPr lang="en-US"/>
           </a:p>
         </p:txBody>
       </p:sp>
@@ -514,10 +513,9 @@
           <a:lstStyle/>
           <a:p>
             <a:r>
-              <a:rPr lang="en-US" smtClean="0"/>
+              <a:rPr lang="en-US"/>
               <a:t>Click to edit Master title style</a:t>
             </a:r>
-            <a:endParaRPr lang="en-US"/>
           </a:p>
         </p:txBody>
       </p:sp>
@@ -633,10 +631,9 @@
           </a:lstStyle>
           <a:p>
             <a:r>
-              <a:rPr lang="en-US" smtClean="0"/>
+              <a:rPr lang="en-US"/>
               <a:t>Click to edit Master subtitle style</a:t>
             </a:r>
-            <a:endParaRPr lang="en-US"/>
           </a:p>
         </p:txBody>
       </p:sp>
@@ -657,7 +654,7 @@
           <a:p>
             <a:fld id="{78C97017-6FC3-485B-9764-EAC9E56C1D49}" type="datetimeFigureOut">
               <a:rPr lang="en-US" smtClean="0"/>
-              <a:t>10/16/18</a:t>
+              <a:t>10/30/18</a:t>
             </a:fld>
             <a:endParaRPr lang="en-US"/>
           </a:p>
@@ -751,10 +748,9 @@
           <a:lstStyle/>
           <a:p>
             <a:r>
-              <a:rPr lang="en-US" smtClean="0"/>
+              <a:rPr lang="en-US"/>
               <a:t>Click to edit Master title style</a:t>
             </a:r>
-            <a:endParaRPr lang="en-US"/>
           </a:p>
         </p:txBody>
       </p:sp>
@@ -775,38 +771,37 @@
           <a:p>
             <a:pPr lvl="0"/>
             <a:r>
-              <a:rPr lang="en-US" smtClean="0"/>
+              <a:rPr lang="en-US"/>
               <a:t>Click to edit Master text styles</a:t>
             </a:r>
           </a:p>
           <a:p>
             <a:pPr lvl="1"/>
             <a:r>
-              <a:rPr lang="en-US" smtClean="0"/>
+              <a:rPr lang="en-US"/>
               <a:t>Second level</a:t>
             </a:r>
           </a:p>
           <a:p>
             <a:pPr lvl="2"/>
             <a:r>
-              <a:rPr lang="en-US" smtClean="0"/>
+              <a:rPr lang="en-US"/>
               <a:t>Third level</a:t>
             </a:r>
           </a:p>
           <a:p>
             <a:pPr lvl="3"/>
             <a:r>
-              <a:rPr lang="en-US" smtClean="0"/>
+              <a:rPr lang="en-US"/>
               <a:t>Fourth level</a:t>
             </a:r>
           </a:p>
           <a:p>
             <a:pPr lvl="4"/>
             <a:r>
-              <a:rPr lang="en-US" smtClean="0"/>
+              <a:rPr lang="en-US"/>
               <a:t>Fifth level</a:t>
             </a:r>
-            <a:endParaRPr lang="en-US"/>
           </a:p>
         </p:txBody>
       </p:sp>
@@ -827,7 +822,7 @@
           <a:p>
             <a:fld id="{78C97017-6FC3-485B-9764-EAC9E56C1D49}" type="datetimeFigureOut">
               <a:rPr lang="en-US" smtClean="0"/>
-              <a:t>10/16/18</a:t>
+              <a:t>10/30/18</a:t>
             </a:fld>
             <a:endParaRPr lang="en-US"/>
           </a:p>
@@ -926,10 +921,9 @@
           <a:lstStyle/>
           <a:p>
             <a:r>
-              <a:rPr lang="en-US" smtClean="0"/>
+              <a:rPr lang="en-US"/>
               <a:t>Click to edit Master title style</a:t>
             </a:r>
-            <a:endParaRPr lang="en-US"/>
           </a:p>
         </p:txBody>
       </p:sp>
@@ -955,38 +949,37 @@
           <a:p>
             <a:pPr lvl="0"/>
             <a:r>
-              <a:rPr lang="en-US" smtClean="0"/>
+              <a:rPr lang="en-US"/>
               <a:t>Click to edit Master text styles</a:t>
             </a:r>
           </a:p>
           <a:p>
             <a:pPr lvl="1"/>
             <a:r>
-              <a:rPr lang="en-US" smtClean="0"/>
+              <a:rPr lang="en-US"/>
               <a:t>Second level</a:t>
             </a:r>
           </a:p>
           <a:p>
             <a:pPr lvl="2"/>
             <a:r>
-              <a:rPr lang="en-US" smtClean="0"/>
+              <a:rPr lang="en-US"/>
               <a:t>Third level</a:t>
             </a:r>
           </a:p>
           <a:p>
             <a:pPr lvl="3"/>
             <a:r>
-              <a:rPr lang="en-US" smtClean="0"/>
+              <a:rPr lang="en-US"/>
               <a:t>Fourth level</a:t>
             </a:r>
           </a:p>
           <a:p>
             <a:pPr lvl="4"/>
             <a:r>
-              <a:rPr lang="en-US" smtClean="0"/>
+              <a:rPr lang="en-US"/>
               <a:t>Fifth level</a:t>
             </a:r>
-            <a:endParaRPr lang="en-US"/>
           </a:p>
         </p:txBody>
       </p:sp>
@@ -1007,7 +1000,7 @@
           <a:p>
             <a:fld id="{78C97017-6FC3-485B-9764-EAC9E56C1D49}" type="datetimeFigureOut">
               <a:rPr lang="en-US" smtClean="0"/>
-              <a:t>10/16/18</a:t>
+              <a:t>10/30/18</a:t>
             </a:fld>
             <a:endParaRPr lang="en-US"/>
           </a:p>
@@ -1101,10 +1094,9 @@
           <a:lstStyle/>
           <a:p>
             <a:r>
-              <a:rPr lang="en-US" smtClean="0"/>
+              <a:rPr lang="en-US"/>
               <a:t>Click to edit Master title style</a:t>
             </a:r>
-            <a:endParaRPr lang="en-US"/>
           </a:p>
         </p:txBody>
       </p:sp>
@@ -1125,38 +1117,37 @@
           <a:p>
             <a:pPr lvl="0"/>
             <a:r>
-              <a:rPr lang="en-US" smtClean="0"/>
+              <a:rPr lang="en-US"/>
               <a:t>Click to edit Master text styles</a:t>
             </a:r>
           </a:p>
           <a:p>
             <a:pPr lvl="1"/>
             <a:r>
-              <a:rPr lang="en-US" smtClean="0"/>
+              <a:rPr lang="en-US"/>
               <a:t>Second level</a:t>
             </a:r>
           </a:p>
           <a:p>
             <a:pPr lvl="2"/>
             <a:r>
-              <a:rPr lang="en-US" smtClean="0"/>
+              <a:rPr lang="en-US"/>
               <a:t>Third level</a:t>
             </a:r>
           </a:p>
           <a:p>
             <a:pPr lvl="3"/>
             <a:r>
-              <a:rPr lang="en-US" smtClean="0"/>
+              <a:rPr lang="en-US"/>
               <a:t>Fourth level</a:t>
             </a:r>
           </a:p>
           <a:p>
             <a:pPr lvl="4"/>
             <a:r>
-              <a:rPr lang="en-US" smtClean="0"/>
+              <a:rPr lang="en-US"/>
               <a:t>Fifth level</a:t>
             </a:r>
-            <a:endParaRPr lang="en-US"/>
           </a:p>
         </p:txBody>
       </p:sp>
@@ -1177,7 +1168,7 @@
           <a:p>
             <a:fld id="{78C97017-6FC3-485B-9764-EAC9E56C1D49}" type="datetimeFigureOut">
               <a:rPr lang="en-US" smtClean="0"/>
-              <a:t>10/16/18</a:t>
+              <a:t>10/30/18</a:t>
             </a:fld>
             <a:endParaRPr lang="en-US"/>
           </a:p>
@@ -1280,10 +1271,9 @@
           </a:lstStyle>
           <a:p>
             <a:r>
-              <a:rPr lang="en-US" smtClean="0"/>
+              <a:rPr lang="en-US"/>
               <a:t>Click to edit Master title style</a:t>
             </a:r>
-            <a:endParaRPr lang="en-US"/>
           </a:p>
         </p:txBody>
       </p:sp>
@@ -1400,7 +1390,7 @@
           <a:p>
             <a:pPr lvl="0"/>
             <a:r>
-              <a:rPr lang="en-US" smtClean="0"/>
+              <a:rPr lang="en-US"/>
               <a:t>Click to edit Master text styles</a:t>
             </a:r>
           </a:p>
@@ -1423,7 +1413,7 @@
           <a:p>
             <a:fld id="{78C97017-6FC3-485B-9764-EAC9E56C1D49}" type="datetimeFigureOut">
               <a:rPr lang="en-US" smtClean="0"/>
-              <a:t>10/16/18</a:t>
+              <a:t>10/30/18</a:t>
             </a:fld>
             <a:endParaRPr lang="en-US"/>
           </a:p>
@@ -1517,10 +1507,9 @@
           <a:lstStyle/>
           <a:p>
             <a:r>
-              <a:rPr lang="en-US" smtClean="0"/>
+              <a:rPr lang="en-US"/>
               <a:t>Click to edit Master title style</a:t>
             </a:r>
-            <a:endParaRPr lang="en-US"/>
           </a:p>
         </p:txBody>
       </p:sp>
@@ -1574,38 +1563,37 @@
           <a:p>
             <a:pPr lvl="0"/>
             <a:r>
-              <a:rPr lang="en-US" smtClean="0"/>
+              <a:rPr lang="en-US"/>
               <a:t>Click to edit Master text styles</a:t>
             </a:r>
           </a:p>
           <a:p>
             <a:pPr lvl="1"/>
             <a:r>
-              <a:rPr lang="en-US" smtClean="0"/>
+              <a:rPr lang="en-US"/>
               <a:t>Second level</a:t>
             </a:r>
           </a:p>
           <a:p>
             <a:pPr lvl="2"/>
             <a:r>
-              <a:rPr lang="en-US" smtClean="0"/>
+              <a:rPr lang="en-US"/>
               <a:t>Third level</a:t>
             </a:r>
           </a:p>
           <a:p>
             <a:pPr lvl="3"/>
             <a:r>
-              <a:rPr lang="en-US" smtClean="0"/>
+              <a:rPr lang="en-US"/>
               <a:t>Fourth level</a:t>
             </a:r>
           </a:p>
           <a:p>
             <a:pPr lvl="4"/>
             <a:r>
-              <a:rPr lang="en-US" smtClean="0"/>
+              <a:rPr lang="en-US"/>
               <a:t>Fifth level</a:t>
             </a:r>
-            <a:endParaRPr lang="en-US"/>
           </a:p>
         </p:txBody>
       </p:sp>
@@ -1659,38 +1647,37 @@
           <a:p>
             <a:pPr lvl="0"/>
             <a:r>
-              <a:rPr lang="en-US" smtClean="0"/>
+              <a:rPr lang="en-US"/>
               <a:t>Click to edit Master text styles</a:t>
             </a:r>
           </a:p>
           <a:p>
             <a:pPr lvl="1"/>
             <a:r>
-              <a:rPr lang="en-US" smtClean="0"/>
+              <a:rPr lang="en-US"/>
               <a:t>Second level</a:t>
             </a:r>
           </a:p>
           <a:p>
             <a:pPr lvl="2"/>
             <a:r>
-              <a:rPr lang="en-US" smtClean="0"/>
+              <a:rPr lang="en-US"/>
               <a:t>Third level</a:t>
             </a:r>
           </a:p>
           <a:p>
             <a:pPr lvl="3"/>
             <a:r>
-              <a:rPr lang="en-US" smtClean="0"/>
+              <a:rPr lang="en-US"/>
               <a:t>Fourth level</a:t>
             </a:r>
           </a:p>
           <a:p>
             <a:pPr lvl="4"/>
             <a:r>
-              <a:rPr lang="en-US" smtClean="0"/>
+              <a:rPr lang="en-US"/>
               <a:t>Fifth level</a:t>
             </a:r>
-            <a:endParaRPr lang="en-US"/>
           </a:p>
         </p:txBody>
       </p:sp>
@@ -1711,7 +1698,7 @@
           <a:p>
             <a:fld id="{78C97017-6FC3-485B-9764-EAC9E56C1D49}" type="datetimeFigureOut">
               <a:rPr lang="en-US" smtClean="0"/>
-              <a:t>10/16/18</a:t>
+              <a:t>10/30/18</a:t>
             </a:fld>
             <a:endParaRPr lang="en-US"/>
           </a:p>
@@ -1809,10 +1796,9 @@
           </a:lstStyle>
           <a:p>
             <a:r>
-              <a:rPr lang="en-US" smtClean="0"/>
+              <a:rPr lang="en-US"/>
               <a:t>Click to edit Master title style</a:t>
             </a:r>
-            <a:endParaRPr lang="en-US"/>
           </a:p>
         </p:txBody>
       </p:sp>
@@ -1875,7 +1861,7 @@
           <a:p>
             <a:pPr lvl="0"/>
             <a:r>
-              <a:rPr lang="en-US" smtClean="0"/>
+              <a:rPr lang="en-US"/>
               <a:t>Click to edit Master text styles</a:t>
             </a:r>
           </a:p>
@@ -1931,38 +1917,37 @@
           <a:p>
             <a:pPr lvl="0"/>
             <a:r>
-              <a:rPr lang="en-US" smtClean="0"/>
+              <a:rPr lang="en-US"/>
               <a:t>Click to edit Master text styles</a:t>
             </a:r>
           </a:p>
           <a:p>
             <a:pPr lvl="1"/>
             <a:r>
-              <a:rPr lang="en-US" smtClean="0"/>
+              <a:rPr lang="en-US"/>
               <a:t>Second level</a:t>
             </a:r>
           </a:p>
           <a:p>
             <a:pPr lvl="2"/>
             <a:r>
-              <a:rPr lang="en-US" smtClean="0"/>
+              <a:rPr lang="en-US"/>
               <a:t>Third level</a:t>
             </a:r>
           </a:p>
           <a:p>
             <a:pPr lvl="3"/>
             <a:r>
-              <a:rPr lang="en-US" smtClean="0"/>
+              <a:rPr lang="en-US"/>
               <a:t>Fourth level</a:t>
             </a:r>
           </a:p>
           <a:p>
             <a:pPr lvl="4"/>
             <a:r>
-              <a:rPr lang="en-US" smtClean="0"/>
+              <a:rPr lang="en-US"/>
               <a:t>Fifth level</a:t>
             </a:r>
-            <a:endParaRPr lang="en-US"/>
           </a:p>
         </p:txBody>
       </p:sp>
@@ -2025,7 +2010,7 @@
           <a:p>
             <a:pPr lvl="0"/>
             <a:r>
-              <a:rPr lang="en-US" smtClean="0"/>
+              <a:rPr lang="en-US"/>
               <a:t>Click to edit Master text styles</a:t>
             </a:r>
           </a:p>
@@ -2081,38 +2066,37 @@
           <a:p>
             <a:pPr lvl="0"/>
             <a:r>
-              <a:rPr lang="en-US" smtClean="0"/>
+              <a:rPr lang="en-US"/>
               <a:t>Click to edit Master text styles</a:t>
             </a:r>
           </a:p>
           <a:p>
             <a:pPr lvl="1"/>
             <a:r>
-              <a:rPr lang="en-US" smtClean="0"/>
+              <a:rPr lang="en-US"/>
               <a:t>Second level</a:t>
             </a:r>
           </a:p>
           <a:p>
             <a:pPr lvl="2"/>
             <a:r>
-              <a:rPr lang="en-US" smtClean="0"/>
+              <a:rPr lang="en-US"/>
               <a:t>Third level</a:t>
             </a:r>
           </a:p>
           <a:p>
             <a:pPr lvl="3"/>
             <a:r>
-              <a:rPr lang="en-US" smtClean="0"/>
+              <a:rPr lang="en-US"/>
               <a:t>Fourth level</a:t>
             </a:r>
           </a:p>
           <a:p>
             <a:pPr lvl="4"/>
             <a:r>
-              <a:rPr lang="en-US" smtClean="0"/>
+              <a:rPr lang="en-US"/>
               <a:t>Fifth level</a:t>
             </a:r>
-            <a:endParaRPr lang="en-US"/>
           </a:p>
         </p:txBody>
       </p:sp>
@@ -2133,7 +2117,7 @@
           <a:p>
             <a:fld id="{78C97017-6FC3-485B-9764-EAC9E56C1D49}" type="datetimeFigureOut">
               <a:rPr lang="en-US" smtClean="0"/>
-              <a:t>10/16/18</a:t>
+              <a:t>10/30/18</a:t>
             </a:fld>
             <a:endParaRPr lang="en-US"/>
           </a:p>
@@ -2227,10 +2211,9 @@
           <a:lstStyle/>
           <a:p>
             <a:r>
-              <a:rPr lang="en-US" smtClean="0"/>
+              <a:rPr lang="en-US"/>
               <a:t>Click to edit Master title style</a:t>
             </a:r>
-            <a:endParaRPr lang="en-US"/>
           </a:p>
         </p:txBody>
       </p:sp>
@@ -2251,7 +2234,7 @@
           <a:p>
             <a:fld id="{78C97017-6FC3-485B-9764-EAC9E56C1D49}" type="datetimeFigureOut">
               <a:rPr lang="en-US" smtClean="0"/>
-              <a:t>10/16/18</a:t>
+              <a:t>10/30/18</a:t>
             </a:fld>
             <a:endParaRPr lang="en-US"/>
           </a:p>
@@ -2346,7 +2329,7 @@
           <a:p>
             <a:fld id="{78C97017-6FC3-485B-9764-EAC9E56C1D49}" type="datetimeFigureOut">
               <a:rPr lang="en-US" smtClean="0"/>
-              <a:t>10/16/18</a:t>
+              <a:t>10/30/18</a:t>
             </a:fld>
             <a:endParaRPr lang="en-US"/>
           </a:p>
@@ -2449,10 +2432,9 @@
           </a:lstStyle>
           <a:p>
             <a:r>
-              <a:rPr lang="en-US" smtClean="0"/>
+              <a:rPr lang="en-US"/>
               <a:t>Click to edit Master title style</a:t>
             </a:r>
-            <a:endParaRPr lang="en-US"/>
           </a:p>
         </p:txBody>
       </p:sp>
@@ -2506,38 +2488,37 @@
           <a:p>
             <a:pPr lvl="0"/>
             <a:r>
-              <a:rPr lang="en-US" smtClean="0"/>
+              <a:rPr lang="en-US"/>
               <a:t>Click to edit Master text styles</a:t>
             </a:r>
           </a:p>
           <a:p>
             <a:pPr lvl="1"/>
             <a:r>
-              <a:rPr lang="en-US" smtClean="0"/>
+              <a:rPr lang="en-US"/>
               <a:t>Second level</a:t>
             </a:r>
           </a:p>
           <a:p>
             <a:pPr lvl="2"/>
             <a:r>
-              <a:rPr lang="en-US" smtClean="0"/>
+              <a:rPr lang="en-US"/>
               <a:t>Third level</a:t>
             </a:r>
           </a:p>
           <a:p>
             <a:pPr lvl="3"/>
             <a:r>
-              <a:rPr lang="en-US" smtClean="0"/>
+              <a:rPr lang="en-US"/>
               <a:t>Fourth level</a:t>
             </a:r>
           </a:p>
           <a:p>
             <a:pPr lvl="4"/>
             <a:r>
-              <a:rPr lang="en-US" smtClean="0"/>
+              <a:rPr lang="en-US"/>
               <a:t>Fifth level</a:t>
             </a:r>
-            <a:endParaRPr lang="en-US"/>
           </a:p>
         </p:txBody>
       </p:sp>
@@ -2600,7 +2581,7 @@
           <a:p>
             <a:pPr lvl="0"/>
             <a:r>
-              <a:rPr lang="en-US" smtClean="0"/>
+              <a:rPr lang="en-US"/>
               <a:t>Click to edit Master text styles</a:t>
             </a:r>
           </a:p>
@@ -2623,7 +2604,7 @@
           <a:p>
             <a:fld id="{78C97017-6FC3-485B-9764-EAC9E56C1D49}" type="datetimeFigureOut">
               <a:rPr lang="en-US" smtClean="0"/>
-              <a:t>10/16/18</a:t>
+              <a:t>10/30/18</a:t>
             </a:fld>
             <a:endParaRPr lang="en-US"/>
           </a:p>
@@ -2726,10 +2707,9 @@
           </a:lstStyle>
           <a:p>
             <a:r>
-              <a:rPr lang="en-US" smtClean="0"/>
+              <a:rPr lang="en-US"/>
               <a:t>Click to edit Master title style</a:t>
             </a:r>
-            <a:endParaRPr lang="en-US"/>
           </a:p>
         </p:txBody>
       </p:sp>
@@ -2853,7 +2833,7 @@
           <a:p>
             <a:pPr lvl="0"/>
             <a:r>
-              <a:rPr lang="en-US" smtClean="0"/>
+              <a:rPr lang="en-US"/>
               <a:t>Click to edit Master text styles</a:t>
             </a:r>
           </a:p>
@@ -2876,7 +2856,7 @@
           <a:p>
             <a:fld id="{78C97017-6FC3-485B-9764-EAC9E56C1D49}" type="datetimeFigureOut">
               <a:rPr lang="en-US" smtClean="0"/>
-              <a:t>10/16/18</a:t>
+              <a:t>10/30/18</a:t>
             </a:fld>
             <a:endParaRPr lang="en-US"/>
           </a:p>
@@ -2985,10 +2965,9 @@
           <a:lstStyle/>
           <a:p>
             <a:r>
-              <a:rPr lang="en-US" smtClean="0"/>
+              <a:rPr lang="en-US"/>
               <a:t>Click to edit Master title style</a:t>
             </a:r>
-            <a:endParaRPr lang="en-US"/>
           </a:p>
         </p:txBody>
       </p:sp>
@@ -3019,38 +2998,37 @@
           <a:p>
             <a:pPr lvl="0"/>
             <a:r>
-              <a:rPr lang="en-US" smtClean="0"/>
+              <a:rPr lang="en-US"/>
               <a:t>Click to edit Master text styles</a:t>
             </a:r>
           </a:p>
           <a:p>
             <a:pPr lvl="1"/>
             <a:r>
-              <a:rPr lang="en-US" smtClean="0"/>
+              <a:rPr lang="en-US"/>
               <a:t>Second level</a:t>
             </a:r>
           </a:p>
           <a:p>
             <a:pPr lvl="2"/>
             <a:r>
-              <a:rPr lang="en-US" smtClean="0"/>
+              <a:rPr lang="en-US"/>
               <a:t>Third level</a:t>
             </a:r>
           </a:p>
           <a:p>
             <a:pPr lvl="3"/>
             <a:r>
-              <a:rPr lang="en-US" smtClean="0"/>
+              <a:rPr lang="en-US"/>
               <a:t>Fourth level</a:t>
             </a:r>
           </a:p>
           <a:p>
             <a:pPr lvl="4"/>
             <a:r>
-              <a:rPr lang="en-US" smtClean="0"/>
+              <a:rPr lang="en-US"/>
               <a:t>Fifth level</a:t>
             </a:r>
-            <a:endParaRPr lang="en-US"/>
           </a:p>
         </p:txBody>
       </p:sp>
@@ -3089,7 +3067,7 @@
           <a:p>
             <a:fld id="{78C97017-6FC3-485B-9764-EAC9E56C1D49}" type="datetimeFigureOut">
               <a:rPr lang="en-US" smtClean="0"/>
-              <a:t>10/16/18</a:t>
+              <a:t>10/30/18</a:t>
             </a:fld>
             <a:endParaRPr lang="en-US"/>
           </a:p>
@@ -3508,7 +3486,7 @@
           <a:p>
             <a:pPr algn="ctr"/>
             <a:r>
-              <a:rPr lang="en-US" sz="1600" dirty="0" smtClean="0">
+              <a:rPr lang="en-US" sz="1600" dirty="0">
                 <a:solidFill>
                   <a:schemeClr val="bg1"/>
                 </a:solidFill>
@@ -3872,7 +3850,7 @@
           <a:p>
             <a:pPr algn="ctr"/>
             <a:r>
-              <a:rPr lang="en-US" sz="1600" dirty="0" smtClean="0">
+              <a:rPr lang="en-US" sz="1600" dirty="0">
                 <a:solidFill>
                   <a:schemeClr val="bg1"/>
                 </a:solidFill>
@@ -4019,7 +3997,7 @@
           <a:p>
             <a:pPr algn="ctr"/>
             <a:r>
-              <a:rPr lang="en-US" sz="1600" dirty="0" smtClean="0">
+              <a:rPr lang="en-US" sz="1600" dirty="0">
                 <a:solidFill>
                   <a:schemeClr val="bg1"/>
                 </a:solidFill>
@@ -4181,10 +4159,9 @@
           <a:lstStyle/>
           <a:p>
             <a:r>
-              <a:rPr lang="en-US" sz="1400" dirty="0" smtClean="0"/>
+              <a:rPr lang="en-US" sz="1400" dirty="0"/>
               <a:t>generate</a:t>
             </a:r>
-            <a:endParaRPr lang="en-US" sz="1400" dirty="0"/>
           </a:p>
         </p:txBody>
       </p:sp>
@@ -4248,26 +4225,13 @@
           <a:p>
             <a:pPr algn="ctr"/>
             <a:r>
-              <a:rPr lang="en-US" sz="1400" dirty="0" smtClean="0">
+              <a:rPr lang="en-US" sz="1400" dirty="0">
                 <a:solidFill>
                   <a:srgbClr val="0070C0"/>
                 </a:solidFill>
               </a:rPr>
-              <a:t>execute</a:t>
-            </a:r>
-            <a:r>
-              <a:rPr lang="en-US" sz="1400" dirty="0" smtClean="0">
-                <a:solidFill>
-                  <a:srgbClr val="0070C0"/>
-                </a:solidFill>
-              </a:rPr>
-              <a:t>()</a:t>
-            </a:r>
-            <a:endParaRPr lang="en-US" sz="1400" dirty="0">
-              <a:solidFill>
-                <a:srgbClr val="0070C0"/>
-              </a:solidFill>
-            </a:endParaRPr>
+              <a:t>execute()</a:t>
+            </a:r>
           </a:p>
         </p:txBody>
       </p:sp>
@@ -4315,7 +4279,7 @@
         </p:nvSpPr>
         <p:spPr>
           <a:xfrm>
-            <a:off x="4137754" y="1542583"/>
+            <a:off x="4137754" y="1295400"/>
             <a:ext cx="1424846" cy="215444"/>
           </a:xfrm>
           <a:prstGeom prst="rect">
@@ -4330,26 +4294,21 @@
           <a:lstStyle/>
           <a:p>
             <a:r>
-              <a:rPr lang="en-US" sz="1400" dirty="0" err="1" smtClean="0">
+              <a:rPr lang="en-US" sz="1400" dirty="0" err="1">
                 <a:solidFill>
                   <a:srgbClr val="7030A0"/>
                 </a:solidFill>
               </a:rPr>
-              <a:t>getCurrentUser</a:t>
-            </a:r>
-            <a:r>
-              <a:rPr lang="en-US" sz="1400" dirty="0" smtClean="0">
+              <a:t>generateSchedule</a:t>
+            </a:r>
+            <a:r>
+              <a:rPr lang="en-US" sz="1400" dirty="0">
                 <a:solidFill>
                   <a:srgbClr val="7030A0"/>
                 </a:solidFill>
               </a:rPr>
               <a:t>()</a:t>
             </a:r>
-            <a:endParaRPr lang="en-US" sz="1400" dirty="0">
-              <a:solidFill>
-                <a:srgbClr val="7030A0"/>
-              </a:solidFill>
-            </a:endParaRPr>
           </a:p>
         </p:txBody>
       </p:sp>
@@ -4469,13 +4428,265 @@
       </p:cxnSp>
       <p:sp>
         <p:nvSpPr>
-          <p:cNvPr id="39" name="Rectangle 62"/>
+          <p:cNvPr id="53" name="Rectangle 62"/>
           <p:cNvSpPr/>
           <p:nvPr/>
         </p:nvSpPr>
         <p:spPr>
           <a:xfrm>
-            <a:off x="7696200" y="1600200"/>
+            <a:off x="7370178" y="4278322"/>
+            <a:ext cx="1093635" cy="346760"/>
+          </a:xfrm>
+          <a:prstGeom prst="rect">
+            <a:avLst/>
+          </a:prstGeom>
+          <a:solidFill>
+            <a:schemeClr val="accent6">
+              <a:lumMod val="75000"/>
+            </a:schemeClr>
+          </a:solidFill>
+          <a:ln w="19050">
+            <a:solidFill>
+              <a:schemeClr val="accent6">
+                <a:lumMod val="75000"/>
+              </a:schemeClr>
+            </a:solidFill>
+          </a:ln>
+          <a:effectLst/>
+        </p:spPr>
+        <p:style>
+          <a:lnRef idx="1">
+            <a:schemeClr val="accent2"/>
+          </a:lnRef>
+          <a:fillRef idx="2">
+            <a:schemeClr val="accent2"/>
+          </a:fillRef>
+          <a:effectRef idx="1">
+            <a:schemeClr val="accent2"/>
+          </a:effectRef>
+          <a:fontRef idx="minor">
+            <a:schemeClr val="dk1"/>
+          </a:fontRef>
+        </p:style>
+        <p:txBody>
+          <a:bodyPr rtlCol="0" anchor="ctr"/>
+          <a:lstStyle/>
+          <a:p>
+            <a:pPr algn="ctr"/>
+            <a:r>
+              <a:rPr lang="en-US" sz="1600" dirty="0">
+                <a:solidFill>
+                  <a:schemeClr val="bg1"/>
+                </a:solidFill>
+              </a:rPr>
+              <a:t>:Storage</a:t>
+            </a:r>
+            <a:endParaRPr lang="en-SG" sz="1600" dirty="0">
+              <a:solidFill>
+                <a:schemeClr val="bg1"/>
+              </a:solidFill>
+            </a:endParaRPr>
+          </a:p>
+        </p:txBody>
+      </p:sp>
+      <p:cxnSp>
+        <p:nvCxnSpPr>
+          <p:cNvPr id="54" name="Straight Connector 53"/>
+          <p:cNvCxnSpPr/>
+          <p:nvPr/>
+        </p:nvCxnSpPr>
+        <p:spPr>
+          <a:xfrm>
+            <a:off x="7916995" y="4641993"/>
+            <a:ext cx="0" cy="1723059"/>
+          </a:xfrm>
+          <a:prstGeom prst="line">
+            <a:avLst/>
+          </a:prstGeom>
+          <a:ln w="19050">
+            <a:solidFill>
+              <a:schemeClr val="accent6">
+                <a:lumMod val="75000"/>
+              </a:schemeClr>
+            </a:solidFill>
+            <a:prstDash val="sysDash"/>
+          </a:ln>
+          <a:effectLst/>
+        </p:spPr>
+        <p:style>
+          <a:lnRef idx="1">
+            <a:schemeClr val="accent1"/>
+          </a:lnRef>
+          <a:fillRef idx="2">
+            <a:schemeClr val="accent1"/>
+          </a:fillRef>
+          <a:effectRef idx="1">
+            <a:schemeClr val="accent1"/>
+          </a:effectRef>
+          <a:fontRef idx="minor">
+            <a:schemeClr val="dk1"/>
+          </a:fontRef>
+        </p:style>
+      </p:cxnSp>
+      <p:sp>
+        <p:nvSpPr>
+          <p:cNvPr id="55" name="Rectangle 54"/>
+          <p:cNvSpPr/>
+          <p:nvPr/>
+        </p:nvSpPr>
+        <p:spPr>
+          <a:xfrm>
+            <a:off x="7844987" y="5335662"/>
+            <a:ext cx="124478" cy="287409"/>
+          </a:xfrm>
+          <a:prstGeom prst="rect">
+            <a:avLst/>
+          </a:prstGeom>
+          <a:solidFill>
+            <a:schemeClr val="accent6">
+              <a:lumMod val="75000"/>
+            </a:schemeClr>
+          </a:solidFill>
+          <a:ln>
+            <a:solidFill>
+              <a:schemeClr val="accent6">
+                <a:lumMod val="75000"/>
+              </a:schemeClr>
+            </a:solidFill>
+          </a:ln>
+          <a:effectLst/>
+        </p:spPr>
+        <p:style>
+          <a:lnRef idx="1">
+            <a:schemeClr val="accent3"/>
+          </a:lnRef>
+          <a:fillRef idx="2">
+            <a:schemeClr val="accent3"/>
+          </a:fillRef>
+          <a:effectRef idx="1">
+            <a:schemeClr val="accent3"/>
+          </a:effectRef>
+          <a:fontRef idx="minor">
+            <a:schemeClr val="dk1"/>
+          </a:fontRef>
+        </p:style>
+        <p:txBody>
+          <a:bodyPr rtlCol="0" anchor="ctr"/>
+          <a:lstStyle/>
+          <a:p>
+            <a:pPr algn="ctr"/>
+            <a:endParaRPr lang="en-SG" sz="1400">
+              <a:solidFill>
+                <a:schemeClr val="dk1"/>
+              </a:solidFill>
+            </a:endParaRPr>
+          </a:p>
+        </p:txBody>
+      </p:sp>
+      <p:sp>
+        <p:nvSpPr>
+          <p:cNvPr id="62" name="TextBox 61"/>
+          <p:cNvSpPr txBox="1"/>
+          <p:nvPr/>
+        </p:nvSpPr>
+        <p:spPr>
+          <a:xfrm>
+            <a:off x="1810094" y="4797674"/>
+            <a:ext cx="2716635" cy="215444"/>
+          </a:xfrm>
+          <a:prstGeom prst="rect">
+            <a:avLst/>
+          </a:prstGeom>
+          <a:noFill/>
+        </p:spPr>
+        <p:txBody>
+          <a:bodyPr wrap="square" lIns="0" tIns="0" rIns="0" bIns="0" rtlCol="0">
+            <a:spAutoFit/>
+          </a:bodyPr>
+          <a:lstStyle/>
+          <a:p>
+            <a:r>
+              <a:rPr lang="en-US" sz="1400" dirty="0">
+                <a:solidFill>
+                  <a:schemeClr val="accent5">
+                    <a:lumMod val="75000"/>
+                  </a:schemeClr>
+                </a:solidFill>
+              </a:rPr>
+              <a:t>post(</a:t>
+            </a:r>
+            <a:r>
+              <a:rPr lang="en-US" sz="1400" dirty="0" err="1">
+                <a:solidFill>
+                  <a:schemeClr val="accent5">
+                    <a:lumMod val="75000"/>
+                  </a:schemeClr>
+                </a:solidFill>
+              </a:rPr>
+              <a:t>AddressBookChangedEvent</a:t>
+            </a:r>
+            <a:r>
+              <a:rPr lang="en-US" sz="1400" dirty="0">
+                <a:solidFill>
+                  <a:schemeClr val="accent5">
+                    <a:lumMod val="75000"/>
+                  </a:schemeClr>
+                </a:solidFill>
+              </a:rPr>
+              <a:t>)</a:t>
+            </a:r>
+          </a:p>
+        </p:txBody>
+      </p:sp>
+      <p:cxnSp>
+        <p:nvCxnSpPr>
+          <p:cNvPr id="63" name="Straight Arrow Connector 62"/>
+          <p:cNvCxnSpPr/>
+          <p:nvPr/>
+        </p:nvCxnSpPr>
+        <p:spPr>
+          <a:xfrm flipH="1">
+            <a:off x="4526729" y="5623071"/>
+            <a:ext cx="3383941" cy="0"/>
+          </a:xfrm>
+          <a:prstGeom prst="straightConnector1">
+            <a:avLst/>
+          </a:prstGeom>
+          <a:ln w="19050">
+            <a:solidFill>
+              <a:schemeClr val="accent6">
+                <a:lumMod val="75000"/>
+              </a:schemeClr>
+            </a:solidFill>
+            <a:prstDash val="sysDash"/>
+            <a:headEnd type="none" w="med" len="med"/>
+            <a:tailEnd type="arrow" w="med" len="med"/>
+          </a:ln>
+        </p:spPr>
+        <p:style>
+          <a:lnRef idx="1">
+            <a:schemeClr val="accent1"/>
+          </a:lnRef>
+          <a:fillRef idx="0">
+            <a:schemeClr val="accent1"/>
+          </a:fillRef>
+          <a:effectRef idx="0">
+            <a:schemeClr val="accent1"/>
+          </a:effectRef>
+          <a:fontRef idx="minor">
+            <a:schemeClr val="tx1"/>
+          </a:fontRef>
+        </p:style>
+      </p:cxnSp>
+      <p:sp>
+        <p:nvSpPr>
+          <p:cNvPr id="66" name="Rectangle 62"/>
+          <p:cNvSpPr/>
+          <p:nvPr/>
+        </p:nvSpPr>
+        <p:spPr>
+          <a:xfrm>
+            <a:off x="3791146" y="4295233"/>
             <a:ext cx="1371600" cy="346760"/>
           </a:xfrm>
           <a:prstGeom prst="rect">
@@ -4515,12 +4726,20 @@
           <a:p>
             <a:pPr algn="ctr"/>
             <a:r>
-              <a:rPr lang="en-US" sz="1600" smtClean="0">
+              <a:rPr lang="en-US" sz="1600" dirty="0">
                 <a:solidFill>
                   <a:schemeClr val="bg1"/>
                 </a:solidFill>
               </a:rPr>
-              <a:t>:Generate</a:t>
+              <a:t>:</a:t>
+            </a:r>
+            <a:r>
+              <a:rPr lang="en-US" sz="1600" dirty="0" err="1">
+                <a:solidFill>
+                  <a:schemeClr val="bg1"/>
+                </a:solidFill>
+              </a:rPr>
+              <a:t>EventsCenter</a:t>
             </a:r>
             <a:endParaRPr lang="en-SG" sz="1600" dirty="0">
               <a:solidFill>
@@ -4532,14 +4751,14 @@
       </p:sp>
       <p:cxnSp>
         <p:nvCxnSpPr>
-          <p:cNvPr id="40" name="Straight Connector 39"/>
+          <p:cNvPr id="67" name="Straight Connector 66"/>
           <p:cNvCxnSpPr/>
           <p:nvPr/>
         </p:nvCxnSpPr>
         <p:spPr>
           <a:xfrm>
-            <a:off x="8615797" y="1899007"/>
-            <a:ext cx="1005" cy="768357"/>
+            <a:off x="4456731" y="4648287"/>
+            <a:ext cx="0" cy="1723059"/>
           </a:xfrm>
           <a:prstGeom prst="line">
             <a:avLst/>
@@ -4571,14 +4790,14 @@
       </p:cxnSp>
       <p:sp>
         <p:nvSpPr>
-          <p:cNvPr id="41" name="Rectangle 40"/>
+          <p:cNvPr id="68" name="Rectangle 67"/>
           <p:cNvSpPr/>
           <p:nvPr/>
         </p:nvSpPr>
         <p:spPr>
           <a:xfrm>
-            <a:off x="8544794" y="1905000"/>
-            <a:ext cx="142006" cy="180000"/>
+            <a:off x="4384723" y="5071220"/>
+            <a:ext cx="142006" cy="1036757"/>
           </a:xfrm>
           <a:prstGeom prst="rect">
             <a:avLst/>
@@ -4626,14 +4845,50 @@
       </p:sp>
       <p:cxnSp>
         <p:nvCxnSpPr>
-          <p:cNvPr id="44" name="Straight Arrow Connector 43"/>
+          <p:cNvPr id="69" name="Straight Arrow Connector 68"/>
           <p:cNvCxnSpPr/>
           <p:nvPr/>
         </p:nvCxnSpPr>
         <p:spPr>
           <a:xfrm>
-            <a:off x="3953404" y="2426923"/>
-            <a:ext cx="4590386" cy="11477"/>
+            <a:off x="3078929" y="5071220"/>
+            <a:ext cx="1295400" cy="0"/>
+          </a:xfrm>
+          <a:prstGeom prst="straightConnector1">
+            <a:avLst/>
+          </a:prstGeom>
+          <a:ln w="19050">
+            <a:solidFill>
+              <a:srgbClr val="7030A0"/>
+            </a:solidFill>
+            <a:tailEnd type="arrow"/>
+          </a:ln>
+        </p:spPr>
+        <p:style>
+          <a:lnRef idx="1">
+            <a:schemeClr val="accent1"/>
+          </a:lnRef>
+          <a:fillRef idx="0">
+            <a:schemeClr val="accent1"/>
+          </a:fillRef>
+          <a:effectRef idx="0">
+            <a:schemeClr val="accent1"/>
+          </a:effectRef>
+          <a:fontRef idx="minor">
+            <a:schemeClr val="tx1"/>
+          </a:fontRef>
+        </p:style>
+      </p:cxnSp>
+      <p:cxnSp>
+        <p:nvCxnSpPr>
+          <p:cNvPr id="70" name="Straight Arrow Connector 69"/>
+          <p:cNvCxnSpPr/>
+          <p:nvPr/>
+        </p:nvCxnSpPr>
+        <p:spPr>
+          <a:xfrm>
+            <a:off x="2975642" y="6107977"/>
+            <a:ext cx="1448755" cy="0"/>
           </a:xfrm>
           <a:prstGeom prst="straightConnector1">
             <a:avLst/>
@@ -4664,30 +4919,147 @@
           </a:fontRef>
         </p:style>
       </p:cxnSp>
-      <p:sp>
-        <p:nvSpPr>
-          <p:cNvPr id="53" name="Rectangle 62"/>
+      <p:cxnSp>
+        <p:nvCxnSpPr>
+          <p:cNvPr id="72" name="Straight Arrow Connector 71"/>
+          <p:cNvCxnSpPr/>
+          <p:nvPr/>
+        </p:nvCxnSpPr>
+        <p:spPr>
+          <a:xfrm>
+            <a:off x="4526729" y="5341014"/>
+            <a:ext cx="3318258" cy="0"/>
+          </a:xfrm>
+          <a:prstGeom prst="straightConnector1">
+            <a:avLst/>
+          </a:prstGeom>
+          <a:ln w="19050">
+            <a:solidFill>
+              <a:schemeClr val="accent5">
+                <a:lumMod val="75000"/>
+              </a:schemeClr>
+            </a:solidFill>
+            <a:headEnd type="none" w="med" len="med"/>
+            <a:tailEnd type="arrow" w="med" len="med"/>
+          </a:ln>
+        </p:spPr>
+        <p:style>
+          <a:lnRef idx="1">
+            <a:schemeClr val="accent1"/>
+          </a:lnRef>
+          <a:fillRef idx="0">
+            <a:schemeClr val="accent1"/>
+          </a:fillRef>
+          <a:effectRef idx="0">
+            <a:schemeClr val="accent1"/>
+          </a:effectRef>
+          <a:fontRef idx="minor">
+            <a:schemeClr val="tx1"/>
+          </a:fontRef>
+        </p:style>
+      </p:cxnSp>
+      <p:sp>
+        <p:nvSpPr>
+          <p:cNvPr id="74" name="TextBox 73"/>
+          <p:cNvSpPr txBox="1"/>
+          <p:nvPr/>
+        </p:nvSpPr>
+        <p:spPr>
+          <a:xfrm>
+            <a:off x="5036330" y="5065911"/>
+            <a:ext cx="2659870" cy="215444"/>
+          </a:xfrm>
+          <a:prstGeom prst="rect">
+            <a:avLst/>
+          </a:prstGeom>
+          <a:noFill/>
+        </p:spPr>
+        <p:txBody>
+          <a:bodyPr wrap="square" lIns="0" tIns="0" rIns="0" bIns="0" rtlCol="0">
+            <a:spAutoFit/>
+          </a:bodyPr>
+          <a:lstStyle/>
+          <a:p>
+            <a:r>
+              <a:rPr lang="en-US" sz="1400" dirty="0" err="1">
+                <a:solidFill>
+                  <a:schemeClr val="accent6">
+                    <a:lumMod val="75000"/>
+                  </a:schemeClr>
+                </a:solidFill>
+              </a:rPr>
+              <a:t>handleAddresssBookChangedEvent</a:t>
+            </a:r>
+            <a:r>
+              <a:rPr lang="en-US" sz="1400" dirty="0">
+                <a:solidFill>
+                  <a:schemeClr val="accent6">
+                    <a:lumMod val="75000"/>
+                  </a:schemeClr>
+                </a:solidFill>
+              </a:rPr>
+              <a:t>()</a:t>
+            </a:r>
+          </a:p>
+        </p:txBody>
+      </p:sp>
+      <p:cxnSp>
+        <p:nvCxnSpPr>
+          <p:cNvPr id="85" name="Straight Connector 84"/>
+          <p:cNvCxnSpPr/>
+          <p:nvPr/>
+        </p:nvCxnSpPr>
+        <p:spPr>
+          <a:xfrm flipH="1">
+            <a:off x="314394" y="1099672"/>
+            <a:ext cx="24" cy="1598671"/>
+          </a:xfrm>
+          <a:prstGeom prst="line">
+            <a:avLst/>
+          </a:prstGeom>
+          <a:ln w="19050">
+            <a:solidFill>
+              <a:schemeClr val="tx1"/>
+            </a:solidFill>
+            <a:prstDash val="sysDash"/>
+          </a:ln>
+          <a:effectLst/>
+        </p:spPr>
+        <p:style>
+          <a:lnRef idx="1">
+            <a:schemeClr val="accent1"/>
+          </a:lnRef>
+          <a:fillRef idx="2">
+            <a:schemeClr val="accent1"/>
+          </a:fillRef>
+          <a:effectRef idx="1">
+            <a:schemeClr val="accent1"/>
+          </a:effectRef>
+          <a:fontRef idx="minor">
+            <a:schemeClr val="dk1"/>
+          </a:fontRef>
+        </p:style>
+      </p:cxnSp>
+      <p:sp>
+        <p:nvSpPr>
+          <p:cNvPr id="45" name="Rectangle 62"/>
           <p:cNvSpPr/>
           <p:nvPr/>
         </p:nvSpPr>
         <p:spPr>
           <a:xfrm>
-            <a:off x="7370178" y="4278322"/>
+            <a:off x="721634" y="4278322"/>
             <a:ext cx="1093635" cy="346760"/>
           </a:xfrm>
           <a:prstGeom prst="rect">
             <a:avLst/>
           </a:prstGeom>
           <a:solidFill>
-            <a:schemeClr val="accent6">
-              <a:lumMod val="75000"/>
-            </a:schemeClr>
+            <a:srgbClr val="00B050"/>
           </a:solidFill>
           <a:ln w="19050">
             <a:solidFill>
-              <a:schemeClr val="accent6">
-                <a:lumMod val="75000"/>
-              </a:schemeClr>
+              <a:srgbClr val="00B050"/>
             </a:solidFill>
           </a:ln>
           <a:effectLst/>
@@ -4712,12 +5084,12 @@
           <a:p>
             <a:pPr algn="ctr"/>
             <a:r>
-              <a:rPr lang="en-US" sz="1600" dirty="0" smtClean="0">
+              <a:rPr lang="en-US" sz="1600" dirty="0">
                 <a:solidFill>
                   <a:schemeClr val="bg1"/>
                 </a:solidFill>
               </a:rPr>
-              <a:t>:Storage</a:t>
+              <a:t>:UI</a:t>
             </a:r>
             <a:endParaRPr lang="en-SG" sz="1600" dirty="0">
               <a:solidFill>
@@ -4729,13 +5101,13 @@
       </p:sp>
       <p:cxnSp>
         <p:nvCxnSpPr>
-          <p:cNvPr id="54" name="Straight Connector 53"/>
+          <p:cNvPr id="46" name="Straight Connector 45"/>
           <p:cNvCxnSpPr/>
           <p:nvPr/>
         </p:nvCxnSpPr>
         <p:spPr>
           <a:xfrm>
-            <a:off x="7916995" y="4641993"/>
+            <a:off x="1268451" y="4641993"/>
             <a:ext cx="0" cy="1723059"/>
           </a:xfrm>
           <a:prstGeom prst="line">
@@ -4743,9 +5115,7 @@
           </a:prstGeom>
           <a:ln w="19050">
             <a:solidFill>
-              <a:schemeClr val="accent6">
-                <a:lumMod val="75000"/>
-              </a:schemeClr>
+              <a:srgbClr val="00B050"/>
             </a:solidFill>
             <a:prstDash val="sysDash"/>
           </a:ln>
@@ -4768,28 +5138,24 @@
       </p:cxnSp>
       <p:sp>
         <p:nvSpPr>
-          <p:cNvPr id="55" name="Rectangle 54"/>
+          <p:cNvPr id="47" name="Rectangle 46"/>
           <p:cNvSpPr/>
           <p:nvPr/>
         </p:nvSpPr>
         <p:spPr>
           <a:xfrm>
-            <a:off x="7844987" y="5335662"/>
-            <a:ext cx="124478" cy="287409"/>
+            <a:off x="1196443" y="5670472"/>
+            <a:ext cx="130545" cy="273128"/>
           </a:xfrm>
           <a:prstGeom prst="rect">
             <a:avLst/>
           </a:prstGeom>
           <a:solidFill>
-            <a:schemeClr val="accent6">
-              <a:lumMod val="75000"/>
-            </a:schemeClr>
+            <a:srgbClr val="00B050"/>
           </a:solidFill>
           <a:ln>
             <a:solidFill>
-              <a:schemeClr val="accent6">
-                <a:lumMod val="75000"/>
-              </a:schemeClr>
+              <a:srgbClr val="00B050"/>
             </a:solidFill>
           </a:ln>
           <a:effectLst/>
@@ -4821,624 +5187,6 @@
           </a:p>
         </p:txBody>
       </p:sp>
-      <p:sp>
-        <p:nvSpPr>
-          <p:cNvPr id="62" name="TextBox 61"/>
-          <p:cNvSpPr txBox="1"/>
-          <p:nvPr/>
-        </p:nvSpPr>
-        <p:spPr>
-          <a:xfrm>
-            <a:off x="1810094" y="4797674"/>
-            <a:ext cx="2716635" cy="215444"/>
-          </a:xfrm>
-          <a:prstGeom prst="rect">
-            <a:avLst/>
-          </a:prstGeom>
-          <a:noFill/>
-        </p:spPr>
-        <p:txBody>
-          <a:bodyPr wrap="square" lIns="0" tIns="0" rIns="0" bIns="0" rtlCol="0">
-            <a:spAutoFit/>
-          </a:bodyPr>
-          <a:lstStyle/>
-          <a:p>
-            <a:r>
-              <a:rPr lang="en-US" sz="1400" dirty="0" smtClean="0">
-                <a:solidFill>
-                  <a:schemeClr val="accent5">
-                    <a:lumMod val="75000"/>
-                  </a:schemeClr>
-                </a:solidFill>
-              </a:rPr>
-              <a:t>post(</a:t>
-            </a:r>
-            <a:r>
-              <a:rPr lang="en-US" sz="1400" dirty="0" err="1" smtClean="0">
-                <a:solidFill>
-                  <a:schemeClr val="accent5">
-                    <a:lumMod val="75000"/>
-                  </a:schemeClr>
-                </a:solidFill>
-              </a:rPr>
-              <a:t>AddressBookChangedEvent</a:t>
-            </a:r>
-            <a:r>
-              <a:rPr lang="en-US" sz="1400" dirty="0" smtClean="0">
-                <a:solidFill>
-                  <a:schemeClr val="accent5">
-                    <a:lumMod val="75000"/>
-                  </a:schemeClr>
-                </a:solidFill>
-              </a:rPr>
-              <a:t>)</a:t>
-            </a:r>
-            <a:endParaRPr lang="en-US" sz="1400" dirty="0">
-              <a:solidFill>
-                <a:schemeClr val="accent5">
-                  <a:lumMod val="75000"/>
-                </a:schemeClr>
-              </a:solidFill>
-            </a:endParaRPr>
-          </a:p>
-        </p:txBody>
-      </p:sp>
-      <p:cxnSp>
-        <p:nvCxnSpPr>
-          <p:cNvPr id="63" name="Straight Arrow Connector 62"/>
-          <p:cNvCxnSpPr/>
-          <p:nvPr/>
-        </p:nvCxnSpPr>
-        <p:spPr>
-          <a:xfrm flipH="1">
-            <a:off x="4526729" y="5623071"/>
-            <a:ext cx="3383941" cy="0"/>
-          </a:xfrm>
-          <a:prstGeom prst="straightConnector1">
-            <a:avLst/>
-          </a:prstGeom>
-          <a:ln w="19050">
-            <a:solidFill>
-              <a:schemeClr val="accent6">
-                <a:lumMod val="75000"/>
-              </a:schemeClr>
-            </a:solidFill>
-            <a:prstDash val="sysDash"/>
-            <a:headEnd type="none" w="med" len="med"/>
-            <a:tailEnd type="arrow" w="med" len="med"/>
-          </a:ln>
-        </p:spPr>
-        <p:style>
-          <a:lnRef idx="1">
-            <a:schemeClr val="accent1"/>
-          </a:lnRef>
-          <a:fillRef idx="0">
-            <a:schemeClr val="accent1"/>
-          </a:fillRef>
-          <a:effectRef idx="0">
-            <a:schemeClr val="accent1"/>
-          </a:effectRef>
-          <a:fontRef idx="minor">
-            <a:schemeClr val="tx1"/>
-          </a:fontRef>
-        </p:style>
-      </p:cxnSp>
-      <p:sp>
-        <p:nvSpPr>
-          <p:cNvPr id="66" name="Rectangle 62"/>
-          <p:cNvSpPr/>
-          <p:nvPr/>
-        </p:nvSpPr>
-        <p:spPr>
-          <a:xfrm>
-            <a:off x="3791146" y="4295233"/>
-            <a:ext cx="1371600" cy="346760"/>
-          </a:xfrm>
-          <a:prstGeom prst="rect">
-            <a:avLst/>
-          </a:prstGeom>
-          <a:solidFill>
-            <a:schemeClr val="accent5">
-              <a:lumMod val="75000"/>
-            </a:schemeClr>
-          </a:solidFill>
-          <a:ln w="19050">
-            <a:solidFill>
-              <a:schemeClr val="accent5">
-                <a:lumMod val="75000"/>
-              </a:schemeClr>
-            </a:solidFill>
-          </a:ln>
-          <a:effectLst/>
-        </p:spPr>
-        <p:style>
-          <a:lnRef idx="1">
-            <a:schemeClr val="accent2"/>
-          </a:lnRef>
-          <a:fillRef idx="2">
-            <a:schemeClr val="accent2"/>
-          </a:fillRef>
-          <a:effectRef idx="1">
-            <a:schemeClr val="accent2"/>
-          </a:effectRef>
-          <a:fontRef idx="minor">
-            <a:schemeClr val="dk1"/>
-          </a:fontRef>
-        </p:style>
-        <p:txBody>
-          <a:bodyPr rtlCol="0" anchor="ctr"/>
-          <a:lstStyle/>
-          <a:p>
-            <a:pPr algn="ctr"/>
-            <a:r>
-              <a:rPr lang="en-US" sz="1600" dirty="0" smtClean="0">
-                <a:solidFill>
-                  <a:schemeClr val="bg1"/>
-                </a:solidFill>
-              </a:rPr>
-              <a:t>:</a:t>
-            </a:r>
-            <a:r>
-              <a:rPr lang="en-US" sz="1600" dirty="0" err="1" smtClean="0">
-                <a:solidFill>
-                  <a:schemeClr val="bg1"/>
-                </a:solidFill>
-              </a:rPr>
-              <a:t>EventsCenter</a:t>
-            </a:r>
-            <a:endParaRPr lang="en-SG" sz="1600" dirty="0">
-              <a:solidFill>
-                <a:schemeClr val="bg1"/>
-              </a:solidFill>
-            </a:endParaRPr>
-          </a:p>
-        </p:txBody>
-      </p:sp>
-      <p:cxnSp>
-        <p:nvCxnSpPr>
-          <p:cNvPr id="67" name="Straight Connector 66"/>
-          <p:cNvCxnSpPr/>
-          <p:nvPr/>
-        </p:nvCxnSpPr>
-        <p:spPr>
-          <a:xfrm>
-            <a:off x="4456731" y="4648287"/>
-            <a:ext cx="0" cy="1723059"/>
-          </a:xfrm>
-          <a:prstGeom prst="line">
-            <a:avLst/>
-          </a:prstGeom>
-          <a:ln w="19050">
-            <a:solidFill>
-              <a:schemeClr val="accent5">
-                <a:lumMod val="75000"/>
-              </a:schemeClr>
-            </a:solidFill>
-            <a:prstDash val="sysDash"/>
-          </a:ln>
-          <a:effectLst/>
-        </p:spPr>
-        <p:style>
-          <a:lnRef idx="1">
-            <a:schemeClr val="accent1"/>
-          </a:lnRef>
-          <a:fillRef idx="2">
-            <a:schemeClr val="accent1"/>
-          </a:fillRef>
-          <a:effectRef idx="1">
-            <a:schemeClr val="accent1"/>
-          </a:effectRef>
-          <a:fontRef idx="minor">
-            <a:schemeClr val="dk1"/>
-          </a:fontRef>
-        </p:style>
-      </p:cxnSp>
-      <p:sp>
-        <p:nvSpPr>
-          <p:cNvPr id="68" name="Rectangle 67"/>
-          <p:cNvSpPr/>
-          <p:nvPr/>
-        </p:nvSpPr>
-        <p:spPr>
-          <a:xfrm>
-            <a:off x="4384723" y="5071220"/>
-            <a:ext cx="142006" cy="1036757"/>
-          </a:xfrm>
-          <a:prstGeom prst="rect">
-            <a:avLst/>
-          </a:prstGeom>
-          <a:solidFill>
-            <a:schemeClr val="accent5">
-              <a:lumMod val="75000"/>
-            </a:schemeClr>
-          </a:solidFill>
-          <a:ln>
-            <a:solidFill>
-              <a:schemeClr val="accent5">
-                <a:lumMod val="75000"/>
-              </a:schemeClr>
-            </a:solidFill>
-          </a:ln>
-          <a:effectLst/>
-        </p:spPr>
-        <p:style>
-          <a:lnRef idx="1">
-            <a:schemeClr val="accent3"/>
-          </a:lnRef>
-          <a:fillRef idx="2">
-            <a:schemeClr val="accent3"/>
-          </a:fillRef>
-          <a:effectRef idx="1">
-            <a:schemeClr val="accent3"/>
-          </a:effectRef>
-          <a:fontRef idx="minor">
-            <a:schemeClr val="dk1"/>
-          </a:fontRef>
-        </p:style>
-        <p:txBody>
-          <a:bodyPr rtlCol="0" anchor="ctr"/>
-          <a:lstStyle/>
-          <a:p>
-            <a:pPr algn="ctr"/>
-            <a:endParaRPr lang="en-SG" sz="1400">
-              <a:solidFill>
-                <a:schemeClr val="dk1"/>
-              </a:solidFill>
-            </a:endParaRPr>
-          </a:p>
-        </p:txBody>
-      </p:sp>
-      <p:cxnSp>
-        <p:nvCxnSpPr>
-          <p:cNvPr id="69" name="Straight Arrow Connector 68"/>
-          <p:cNvCxnSpPr/>
-          <p:nvPr/>
-        </p:nvCxnSpPr>
-        <p:spPr>
-          <a:xfrm>
-            <a:off x="3078929" y="5071220"/>
-            <a:ext cx="1295400" cy="0"/>
-          </a:xfrm>
-          <a:prstGeom prst="straightConnector1">
-            <a:avLst/>
-          </a:prstGeom>
-          <a:ln w="19050">
-            <a:solidFill>
-              <a:srgbClr val="7030A0"/>
-            </a:solidFill>
-            <a:tailEnd type="arrow"/>
-          </a:ln>
-        </p:spPr>
-        <p:style>
-          <a:lnRef idx="1">
-            <a:schemeClr val="accent1"/>
-          </a:lnRef>
-          <a:fillRef idx="0">
-            <a:schemeClr val="accent1"/>
-          </a:fillRef>
-          <a:effectRef idx="0">
-            <a:schemeClr val="accent1"/>
-          </a:effectRef>
-          <a:fontRef idx="minor">
-            <a:schemeClr val="tx1"/>
-          </a:fontRef>
-        </p:style>
-      </p:cxnSp>
-      <p:cxnSp>
-        <p:nvCxnSpPr>
-          <p:cNvPr id="70" name="Straight Arrow Connector 69"/>
-          <p:cNvCxnSpPr/>
-          <p:nvPr/>
-        </p:nvCxnSpPr>
-        <p:spPr>
-          <a:xfrm>
-            <a:off x="2975642" y="6107977"/>
-            <a:ext cx="1448755" cy="0"/>
-          </a:xfrm>
-          <a:prstGeom prst="straightConnector1">
-            <a:avLst/>
-          </a:prstGeom>
-          <a:ln w="19050">
-            <a:solidFill>
-              <a:schemeClr val="accent5">
-                <a:lumMod val="75000"/>
-              </a:schemeClr>
-            </a:solidFill>
-            <a:prstDash val="sysDash"/>
-            <a:headEnd type="arrow" w="med" len="med"/>
-            <a:tailEnd type="none" w="med" len="med"/>
-          </a:ln>
-        </p:spPr>
-        <p:style>
-          <a:lnRef idx="1">
-            <a:schemeClr val="accent1"/>
-          </a:lnRef>
-          <a:fillRef idx="0">
-            <a:schemeClr val="accent1"/>
-          </a:fillRef>
-          <a:effectRef idx="0">
-            <a:schemeClr val="accent1"/>
-          </a:effectRef>
-          <a:fontRef idx="minor">
-            <a:schemeClr val="tx1"/>
-          </a:fontRef>
-        </p:style>
-      </p:cxnSp>
-      <p:cxnSp>
-        <p:nvCxnSpPr>
-          <p:cNvPr id="72" name="Straight Arrow Connector 71"/>
-          <p:cNvCxnSpPr/>
-          <p:nvPr/>
-        </p:nvCxnSpPr>
-        <p:spPr>
-          <a:xfrm>
-            <a:off x="4526729" y="5341014"/>
-            <a:ext cx="3318258" cy="0"/>
-          </a:xfrm>
-          <a:prstGeom prst="straightConnector1">
-            <a:avLst/>
-          </a:prstGeom>
-          <a:ln w="19050">
-            <a:solidFill>
-              <a:schemeClr val="accent5">
-                <a:lumMod val="75000"/>
-              </a:schemeClr>
-            </a:solidFill>
-            <a:headEnd type="none" w="med" len="med"/>
-            <a:tailEnd type="arrow" w="med" len="med"/>
-          </a:ln>
-        </p:spPr>
-        <p:style>
-          <a:lnRef idx="1">
-            <a:schemeClr val="accent1"/>
-          </a:lnRef>
-          <a:fillRef idx="0">
-            <a:schemeClr val="accent1"/>
-          </a:fillRef>
-          <a:effectRef idx="0">
-            <a:schemeClr val="accent1"/>
-          </a:effectRef>
-          <a:fontRef idx="minor">
-            <a:schemeClr val="tx1"/>
-          </a:fontRef>
-        </p:style>
-      </p:cxnSp>
-      <p:sp>
-        <p:nvSpPr>
-          <p:cNvPr id="74" name="TextBox 73"/>
-          <p:cNvSpPr txBox="1"/>
-          <p:nvPr/>
-        </p:nvSpPr>
-        <p:spPr>
-          <a:xfrm>
-            <a:off x="5036330" y="5065911"/>
-            <a:ext cx="2659870" cy="215444"/>
-          </a:xfrm>
-          <a:prstGeom prst="rect">
-            <a:avLst/>
-          </a:prstGeom>
-          <a:noFill/>
-        </p:spPr>
-        <p:txBody>
-          <a:bodyPr wrap="square" lIns="0" tIns="0" rIns="0" bIns="0" rtlCol="0">
-            <a:spAutoFit/>
-          </a:bodyPr>
-          <a:lstStyle/>
-          <a:p>
-            <a:r>
-              <a:rPr lang="en-US" sz="1400" dirty="0" err="1" smtClean="0">
-                <a:solidFill>
-                  <a:schemeClr val="accent6">
-                    <a:lumMod val="75000"/>
-                  </a:schemeClr>
-                </a:solidFill>
-              </a:rPr>
-              <a:t>handleAddresssBookChangedEvent</a:t>
-            </a:r>
-            <a:r>
-              <a:rPr lang="en-US" sz="1400" dirty="0" smtClean="0">
-                <a:solidFill>
-                  <a:schemeClr val="accent6">
-                    <a:lumMod val="75000"/>
-                  </a:schemeClr>
-                </a:solidFill>
-              </a:rPr>
-              <a:t>()</a:t>
-            </a:r>
-            <a:endParaRPr lang="en-US" sz="1400" dirty="0">
-              <a:solidFill>
-                <a:schemeClr val="accent6">
-                  <a:lumMod val="75000"/>
-                </a:schemeClr>
-              </a:solidFill>
-            </a:endParaRPr>
-          </a:p>
-        </p:txBody>
-      </p:sp>
-      <p:cxnSp>
-        <p:nvCxnSpPr>
-          <p:cNvPr id="85" name="Straight Connector 84"/>
-          <p:cNvCxnSpPr/>
-          <p:nvPr/>
-        </p:nvCxnSpPr>
-        <p:spPr>
-          <a:xfrm flipH="1">
-            <a:off x="314394" y="1099672"/>
-            <a:ext cx="24" cy="1598671"/>
-          </a:xfrm>
-          <a:prstGeom prst="line">
-            <a:avLst/>
-          </a:prstGeom>
-          <a:ln w="19050">
-            <a:solidFill>
-              <a:schemeClr val="tx1"/>
-            </a:solidFill>
-            <a:prstDash val="sysDash"/>
-          </a:ln>
-          <a:effectLst/>
-        </p:spPr>
-        <p:style>
-          <a:lnRef idx="1">
-            <a:schemeClr val="accent1"/>
-          </a:lnRef>
-          <a:fillRef idx="2">
-            <a:schemeClr val="accent1"/>
-          </a:fillRef>
-          <a:effectRef idx="1">
-            <a:schemeClr val="accent1"/>
-          </a:effectRef>
-          <a:fontRef idx="minor">
-            <a:schemeClr val="dk1"/>
-          </a:fontRef>
-        </p:style>
-      </p:cxnSp>
-      <p:sp>
-        <p:nvSpPr>
-          <p:cNvPr id="45" name="Rectangle 62"/>
-          <p:cNvSpPr/>
-          <p:nvPr/>
-        </p:nvSpPr>
-        <p:spPr>
-          <a:xfrm>
-            <a:off x="721634" y="4278322"/>
-            <a:ext cx="1093635" cy="346760"/>
-          </a:xfrm>
-          <a:prstGeom prst="rect">
-            <a:avLst/>
-          </a:prstGeom>
-          <a:solidFill>
-            <a:srgbClr val="00B050"/>
-          </a:solidFill>
-          <a:ln w="19050">
-            <a:solidFill>
-              <a:srgbClr val="00B050"/>
-            </a:solidFill>
-          </a:ln>
-          <a:effectLst/>
-        </p:spPr>
-        <p:style>
-          <a:lnRef idx="1">
-            <a:schemeClr val="accent2"/>
-          </a:lnRef>
-          <a:fillRef idx="2">
-            <a:schemeClr val="accent2"/>
-          </a:fillRef>
-          <a:effectRef idx="1">
-            <a:schemeClr val="accent2"/>
-          </a:effectRef>
-          <a:fontRef idx="minor">
-            <a:schemeClr val="dk1"/>
-          </a:fontRef>
-        </p:style>
-        <p:txBody>
-          <a:bodyPr rtlCol="0" anchor="ctr"/>
-          <a:lstStyle/>
-          <a:p>
-            <a:pPr algn="ctr"/>
-            <a:r>
-              <a:rPr lang="en-US" sz="1600" dirty="0" smtClean="0">
-                <a:solidFill>
-                  <a:schemeClr val="bg1"/>
-                </a:solidFill>
-              </a:rPr>
-              <a:t>:UI</a:t>
-            </a:r>
-            <a:endParaRPr lang="en-SG" sz="1600" dirty="0">
-              <a:solidFill>
-                <a:schemeClr val="bg1"/>
-              </a:solidFill>
-            </a:endParaRPr>
-          </a:p>
-        </p:txBody>
-      </p:sp>
-      <p:cxnSp>
-        <p:nvCxnSpPr>
-          <p:cNvPr id="46" name="Straight Connector 45"/>
-          <p:cNvCxnSpPr/>
-          <p:nvPr/>
-        </p:nvCxnSpPr>
-        <p:spPr>
-          <a:xfrm>
-            <a:off x="1268451" y="4641993"/>
-            <a:ext cx="0" cy="1723059"/>
-          </a:xfrm>
-          <a:prstGeom prst="line">
-            <a:avLst/>
-          </a:prstGeom>
-          <a:ln w="19050">
-            <a:solidFill>
-              <a:srgbClr val="00B050"/>
-            </a:solidFill>
-            <a:prstDash val="sysDash"/>
-          </a:ln>
-          <a:effectLst/>
-        </p:spPr>
-        <p:style>
-          <a:lnRef idx="1">
-            <a:schemeClr val="accent1"/>
-          </a:lnRef>
-          <a:fillRef idx="2">
-            <a:schemeClr val="accent1"/>
-          </a:fillRef>
-          <a:effectRef idx="1">
-            <a:schemeClr val="accent1"/>
-          </a:effectRef>
-          <a:fontRef idx="minor">
-            <a:schemeClr val="dk1"/>
-          </a:fontRef>
-        </p:style>
-      </p:cxnSp>
-      <p:sp>
-        <p:nvSpPr>
-          <p:cNvPr id="47" name="Rectangle 46"/>
-          <p:cNvSpPr/>
-          <p:nvPr/>
-        </p:nvSpPr>
-        <p:spPr>
-          <a:xfrm>
-            <a:off x="1196443" y="5670472"/>
-            <a:ext cx="130545" cy="273128"/>
-          </a:xfrm>
-          <a:prstGeom prst="rect">
-            <a:avLst/>
-          </a:prstGeom>
-          <a:solidFill>
-            <a:srgbClr val="00B050"/>
-          </a:solidFill>
-          <a:ln>
-            <a:solidFill>
-              <a:srgbClr val="00B050"/>
-            </a:solidFill>
-          </a:ln>
-          <a:effectLst/>
-        </p:spPr>
-        <p:style>
-          <a:lnRef idx="1">
-            <a:schemeClr val="accent3"/>
-          </a:lnRef>
-          <a:fillRef idx="2">
-            <a:schemeClr val="accent3"/>
-          </a:fillRef>
-          <a:effectRef idx="1">
-            <a:schemeClr val="accent3"/>
-          </a:effectRef>
-          <a:fontRef idx="minor">
-            <a:schemeClr val="dk1"/>
-          </a:fontRef>
-        </p:style>
-        <p:txBody>
-          <a:bodyPr rtlCol="0" anchor="ctr"/>
-          <a:lstStyle/>
-          <a:p>
-            <a:pPr algn="ctr"/>
-            <a:endParaRPr lang="en-SG" sz="1400">
-              <a:solidFill>
-                <a:schemeClr val="dk1"/>
-              </a:solidFill>
-            </a:endParaRPr>
-          </a:p>
-        </p:txBody>
-      </p:sp>
       <p:cxnSp>
         <p:nvCxnSpPr>
           <p:cNvPr id="48" name="Straight Arrow Connector 47"/>
@@ -5539,7 +5287,7 @@
           <a:lstStyle/>
           <a:p>
             <a:r>
-              <a:rPr lang="en-US" sz="1400" dirty="0" err="1" smtClean="0">
+              <a:rPr lang="en-US" sz="1400" dirty="0" err="1">
                 <a:solidFill>
                   <a:srgbClr val="00B050"/>
                 </a:solidFill>
@@ -5547,18 +5295,13 @@
               <a:t>handleAddresssBookChangedEvent</a:t>
             </a:r>
             <a:r>
-              <a:rPr lang="en-US" sz="1400" dirty="0" smtClean="0">
+              <a:rPr lang="en-US" sz="1400" dirty="0">
                 <a:solidFill>
                   <a:srgbClr val="00B050"/>
                 </a:solidFill>
               </a:rPr>
               <a:t>()</a:t>
             </a:r>
-            <a:endParaRPr lang="en-US" sz="1400" dirty="0">
-              <a:solidFill>
-                <a:srgbClr val="00B050"/>
-              </a:solidFill>
-            </a:endParaRPr>
           </a:p>
         </p:txBody>
       </p:sp>
@@ -5745,18 +5488,13 @@
           <a:p>
             <a:pPr algn="r"/>
             <a:r>
-              <a:rPr lang="en-US" sz="1400" dirty="0" smtClean="0">
+              <a:rPr lang="en-US" sz="1400" dirty="0">
                 <a:solidFill>
                   <a:srgbClr val="00B050"/>
                 </a:solidFill>
               </a:rPr>
               <a:t>Update status bar</a:t>
             </a:r>
-            <a:endParaRPr lang="en-US" sz="1400" dirty="0">
-              <a:solidFill>
-                <a:srgbClr val="00B050"/>
-              </a:solidFill>
-            </a:endParaRPr>
           </a:p>
         </p:txBody>
       </p:sp>
@@ -5946,7 +5684,7 @@
           <a:lstStyle/>
           <a:p>
             <a:r>
-              <a:rPr lang="en-US" sz="1400" dirty="0" smtClean="0">
+              <a:rPr lang="en-US" sz="1400" dirty="0">
                 <a:solidFill>
                   <a:schemeClr val="accent6">
                     <a:lumMod val="75000"/>
@@ -5956,7 +5694,7 @@
               <a:t>Save </a:t>
             </a:r>
             <a:br>
-              <a:rPr lang="en-US" sz="1400" dirty="0" smtClean="0">
+              <a:rPr lang="en-US" sz="1400" dirty="0">
                 <a:solidFill>
                   <a:schemeClr val="accent6">
                     <a:lumMod val="75000"/>
@@ -5965,7 +5703,7 @@
               </a:rPr>
             </a:br>
             <a:r>
-              <a:rPr lang="en-US" sz="1400" dirty="0" smtClean="0">
+              <a:rPr lang="en-US" sz="1400" dirty="0">
                 <a:solidFill>
                   <a:schemeClr val="accent6">
                     <a:lumMod val="75000"/>
@@ -5974,26 +5712,208 @@
               </a:rPr>
               <a:t>to file</a:t>
             </a:r>
-            <a:endParaRPr lang="en-US" sz="1400" dirty="0">
+          </a:p>
+        </p:txBody>
+      </p:sp>
+      <p:sp>
+        <p:nvSpPr>
+          <p:cNvPr id="81" name="TextBox 80">
+            <a:extLst>
+              <a:ext uri="{FF2B5EF4-FFF2-40B4-BE49-F238E27FC236}">
+                <a16:creationId xmlns:a16="http://schemas.microsoft.com/office/drawing/2014/main" id="{CA6B07BD-5268-0D48-BA8E-17816771BCCA}"/>
+              </a:ext>
+            </a:extLst>
+          </p:cNvPr>
+          <p:cNvSpPr txBox="1"/>
+          <p:nvPr/>
+        </p:nvSpPr>
+        <p:spPr>
+          <a:xfrm>
+            <a:off x="5909406" y="2133600"/>
+            <a:ext cx="2514600" cy="184666"/>
+          </a:xfrm>
+          <a:prstGeom prst="rect">
+            <a:avLst/>
+          </a:prstGeom>
+          <a:noFill/>
+        </p:spPr>
+        <p:txBody>
+          <a:bodyPr wrap="square" lIns="0" tIns="0" rIns="0" bIns="0" rtlCol="0">
+            <a:spAutoFit/>
+          </a:bodyPr>
+          <a:lstStyle/>
+          <a:p>
+            <a:r>
+              <a:rPr lang="en-US" sz="1200" dirty="0">
+                <a:solidFill>
+                  <a:schemeClr val="accent5">
+                    <a:lumMod val="75000"/>
+                  </a:schemeClr>
+                </a:solidFill>
+              </a:rPr>
+              <a:t>post(</a:t>
+            </a:r>
+            <a:r>
+              <a:rPr lang="en-US" sz="1200" dirty="0" err="1">
+                <a:solidFill>
+                  <a:schemeClr val="accent5">
+                    <a:lumMod val="75000"/>
+                  </a:schemeClr>
+                </a:solidFill>
+              </a:rPr>
+              <a:t>NewGenerateResultAvailableEvent</a:t>
+            </a:r>
+            <a:r>
+              <a:rPr lang="en-US" sz="1200" dirty="0">
+                <a:solidFill>
+                  <a:schemeClr val="accent5">
+                    <a:lumMod val="75000"/>
+                  </a:schemeClr>
+                </a:solidFill>
+              </a:rPr>
+              <a:t>)</a:t>
+            </a:r>
+          </a:p>
+        </p:txBody>
+      </p:sp>
+      <p:sp>
+        <p:nvSpPr>
+          <p:cNvPr id="82" name="Rectangle 62">
+            <a:extLst>
+              <a:ext uri="{FF2B5EF4-FFF2-40B4-BE49-F238E27FC236}">
+                <a16:creationId xmlns:a16="http://schemas.microsoft.com/office/drawing/2014/main" id="{A7253B48-489B-9149-BE9B-5CFD8223B071}"/>
+              </a:ext>
+            </a:extLst>
+          </p:cNvPr>
+          <p:cNvSpPr/>
+          <p:nvPr/>
+        </p:nvSpPr>
+        <p:spPr>
+          <a:xfrm>
+            <a:off x="7696200" y="591251"/>
+            <a:ext cx="1371600" cy="346760"/>
+          </a:xfrm>
+          <a:prstGeom prst="rect">
+            <a:avLst/>
+          </a:prstGeom>
+          <a:solidFill>
+            <a:schemeClr val="accent5">
+              <a:lumMod val="75000"/>
+            </a:schemeClr>
+          </a:solidFill>
+          <a:ln w="19050">
+            <a:solidFill>
+              <a:schemeClr val="accent5">
+                <a:lumMod val="75000"/>
+              </a:schemeClr>
+            </a:solidFill>
+          </a:ln>
+          <a:effectLst/>
+        </p:spPr>
+        <p:style>
+          <a:lnRef idx="1">
+            <a:schemeClr val="accent2"/>
+          </a:lnRef>
+          <a:fillRef idx="2">
+            <a:schemeClr val="accent2"/>
+          </a:fillRef>
+          <a:effectRef idx="1">
+            <a:schemeClr val="accent2"/>
+          </a:effectRef>
+          <a:fontRef idx="minor">
+            <a:schemeClr val="dk1"/>
+          </a:fontRef>
+        </p:style>
+        <p:txBody>
+          <a:bodyPr rtlCol="0" anchor="ctr"/>
+          <a:lstStyle/>
+          <a:p>
+            <a:pPr algn="ctr"/>
+            <a:r>
+              <a:rPr lang="en-US" sz="1600" dirty="0">
+                <a:solidFill>
+                  <a:schemeClr val="bg1"/>
+                </a:solidFill>
+              </a:rPr>
+              <a:t>:</a:t>
+            </a:r>
+            <a:r>
+              <a:rPr lang="en-US" sz="1600" dirty="0" err="1">
+                <a:solidFill>
+                  <a:schemeClr val="bg1"/>
+                </a:solidFill>
+              </a:rPr>
+              <a:t>EventsCenter</a:t>
+            </a:r>
+            <a:endParaRPr lang="en-SG" sz="1600" dirty="0">
               <a:solidFill>
-                <a:schemeClr val="accent6">
-                  <a:lumMod val="75000"/>
-                </a:schemeClr>
+                <a:schemeClr val="bg1"/>
               </a:solidFill>
             </a:endParaRPr>
           </a:p>
         </p:txBody>
       </p:sp>
-      <p:sp>
-        <p:nvSpPr>
-          <p:cNvPr id="71" name="Rectangle 70"/>
+      <p:cxnSp>
+        <p:nvCxnSpPr>
+          <p:cNvPr id="83" name="Straight Connector 82">
+            <a:extLst>
+              <a:ext uri="{FF2B5EF4-FFF2-40B4-BE49-F238E27FC236}">
+                <a16:creationId xmlns:a16="http://schemas.microsoft.com/office/drawing/2014/main" id="{624C883C-FEFC-164B-A10A-D5C66E2510E4}"/>
+              </a:ext>
+            </a:extLst>
+          </p:cNvPr>
+          <p:cNvCxnSpPr/>
+          <p:nvPr/>
+        </p:nvCxnSpPr>
+        <p:spPr>
+          <a:xfrm>
+            <a:off x="8616802" y="944305"/>
+            <a:ext cx="0" cy="1723059"/>
+          </a:xfrm>
+          <a:prstGeom prst="line">
+            <a:avLst/>
+          </a:prstGeom>
+          <a:ln w="19050">
+            <a:solidFill>
+              <a:schemeClr val="accent5">
+                <a:lumMod val="75000"/>
+              </a:schemeClr>
+            </a:solidFill>
+            <a:prstDash val="sysDash"/>
+          </a:ln>
+          <a:effectLst/>
+        </p:spPr>
+        <p:style>
+          <a:lnRef idx="1">
+            <a:schemeClr val="accent1"/>
+          </a:lnRef>
+          <a:fillRef idx="2">
+            <a:schemeClr val="accent1"/>
+          </a:fillRef>
+          <a:effectRef idx="1">
+            <a:schemeClr val="accent1"/>
+          </a:effectRef>
+          <a:fontRef idx="minor">
+            <a:schemeClr val="dk1"/>
+          </a:fontRef>
+        </p:style>
+      </p:cxnSp>
+      <p:sp>
+        <p:nvSpPr>
+          <p:cNvPr id="84" name="Rectangle 83">
+            <a:extLst>
+              <a:ext uri="{FF2B5EF4-FFF2-40B4-BE49-F238E27FC236}">
+                <a16:creationId xmlns:a16="http://schemas.microsoft.com/office/drawing/2014/main" id="{8F9042F7-255E-2642-8C1B-DEC24B74E471}"/>
+              </a:ext>
+            </a:extLst>
+          </p:cNvPr>
           <p:cNvSpPr/>
           <p:nvPr/>
         </p:nvSpPr>
         <p:spPr>
           <a:xfrm>
-            <a:off x="8544794" y="2258400"/>
-            <a:ext cx="142006" cy="180000"/>
+            <a:off x="8544794" y="2339031"/>
+            <a:ext cx="142006" cy="152400"/>
           </a:xfrm>
           <a:prstGeom prst="rect">
             <a:avLst/>
@@ -6041,14 +5961,70 @@
       </p:sp>
       <p:cxnSp>
         <p:nvCxnSpPr>
-          <p:cNvPr id="73" name="Straight Arrow Connector 72"/>
-          <p:cNvCxnSpPr/>
+          <p:cNvPr id="87" name="Straight Arrow Connector 86">
+            <a:extLst>
+              <a:ext uri="{FF2B5EF4-FFF2-40B4-BE49-F238E27FC236}">
+                <a16:creationId xmlns:a16="http://schemas.microsoft.com/office/drawing/2014/main" id="{78FDF342-7467-BB46-A9E4-119E264238FD}"/>
+              </a:ext>
+            </a:extLst>
+          </p:cNvPr>
+          <p:cNvCxnSpPr>
+            <a:cxnSpLocks/>
+          </p:cNvCxnSpPr>
           <p:nvPr/>
         </p:nvCxnSpPr>
         <p:spPr>
           <a:xfrm>
-            <a:off x="3905293" y="1946960"/>
-            <a:ext cx="3790907" cy="0"/>
+            <a:off x="3954093" y="2491431"/>
+            <a:ext cx="4582394" cy="0"/>
+          </a:xfrm>
+          <a:prstGeom prst="straightConnector1">
+            <a:avLst/>
+          </a:prstGeom>
+          <a:ln w="19050">
+            <a:solidFill>
+              <a:schemeClr val="accent5">
+                <a:lumMod val="75000"/>
+              </a:schemeClr>
+            </a:solidFill>
+            <a:prstDash val="sysDash"/>
+            <a:headEnd type="arrow" w="med" len="med"/>
+            <a:tailEnd type="none" w="med" len="med"/>
+          </a:ln>
+        </p:spPr>
+        <p:style>
+          <a:lnRef idx="1">
+            <a:schemeClr val="accent1"/>
+          </a:lnRef>
+          <a:fillRef idx="0">
+            <a:schemeClr val="accent1"/>
+          </a:fillRef>
+          <a:effectRef idx="0">
+            <a:schemeClr val="accent1"/>
+          </a:effectRef>
+          <a:fontRef idx="minor">
+            <a:schemeClr val="tx1"/>
+          </a:fontRef>
+        </p:style>
+      </p:cxnSp>
+      <p:cxnSp>
+        <p:nvCxnSpPr>
+          <p:cNvPr id="88" name="Straight Arrow Connector 87">
+            <a:extLst>
+              <a:ext uri="{FF2B5EF4-FFF2-40B4-BE49-F238E27FC236}">
+                <a16:creationId xmlns:a16="http://schemas.microsoft.com/office/drawing/2014/main" id="{F46016E6-EBF9-4149-B95E-9BBA77C4B4B1}"/>
+              </a:ext>
+            </a:extLst>
+          </p:cNvPr>
+          <p:cNvCxnSpPr>
+            <a:cxnSpLocks/>
+          </p:cNvCxnSpPr>
+          <p:nvPr/>
+        </p:nvCxnSpPr>
+        <p:spPr>
+          <a:xfrm flipV="1">
+            <a:off x="3954093" y="2339031"/>
+            <a:ext cx="4582394" cy="7804"/>
           </a:xfrm>
           <a:prstGeom prst="straightConnector1">
             <a:avLst/>
@@ -6075,16 +6051,85 @@
           </a:fontRef>
         </p:style>
       </p:cxnSp>
+      <p:sp>
+        <p:nvSpPr>
+          <p:cNvPr id="89" name="Rectangle 88">
+            <a:extLst>
+              <a:ext uri="{FF2B5EF4-FFF2-40B4-BE49-F238E27FC236}">
+                <a16:creationId xmlns:a16="http://schemas.microsoft.com/office/drawing/2014/main" id="{B9801E6E-94FB-7A44-9148-5871EC753BCA}"/>
+              </a:ext>
+            </a:extLst>
+          </p:cNvPr>
+          <p:cNvSpPr/>
+          <p:nvPr/>
+        </p:nvSpPr>
+        <p:spPr>
+          <a:xfrm>
+            <a:off x="8550774" y="1931845"/>
+            <a:ext cx="142006" cy="152400"/>
+          </a:xfrm>
+          <a:prstGeom prst="rect">
+            <a:avLst/>
+          </a:prstGeom>
+          <a:solidFill>
+            <a:schemeClr val="accent5">
+              <a:lumMod val="75000"/>
+            </a:schemeClr>
+          </a:solidFill>
+          <a:ln>
+            <a:solidFill>
+              <a:schemeClr val="accent5">
+                <a:lumMod val="75000"/>
+              </a:schemeClr>
+            </a:solidFill>
+          </a:ln>
+          <a:effectLst/>
+        </p:spPr>
+        <p:style>
+          <a:lnRef idx="1">
+            <a:schemeClr val="accent3"/>
+          </a:lnRef>
+          <a:fillRef idx="2">
+            <a:schemeClr val="accent3"/>
+          </a:fillRef>
+          <a:effectRef idx="1">
+            <a:schemeClr val="accent3"/>
+          </a:effectRef>
+          <a:fontRef idx="minor">
+            <a:schemeClr val="dk1"/>
+          </a:fontRef>
+        </p:style>
+        <p:txBody>
+          <a:bodyPr rtlCol="0" anchor="ctr"/>
+          <a:lstStyle/>
+          <a:p>
+            <a:pPr algn="ctr"/>
+            <a:endParaRPr lang="en-SG" sz="1400">
+              <a:solidFill>
+                <a:schemeClr val="dk1"/>
+              </a:solidFill>
+            </a:endParaRPr>
+          </a:p>
+        </p:txBody>
+      </p:sp>
       <p:cxnSp>
         <p:nvCxnSpPr>
-          <p:cNvPr id="75" name="Straight Arrow Connector 74"/>
-          <p:cNvCxnSpPr/>
+          <p:cNvPr id="90" name="Straight Arrow Connector 89">
+            <a:extLst>
+              <a:ext uri="{FF2B5EF4-FFF2-40B4-BE49-F238E27FC236}">
+                <a16:creationId xmlns:a16="http://schemas.microsoft.com/office/drawing/2014/main" id="{98DE8C44-B892-1C40-B921-8F85E9A67130}"/>
+              </a:ext>
+            </a:extLst>
+          </p:cNvPr>
+          <p:cNvCxnSpPr>
+            <a:cxnSpLocks/>
+          </p:cNvCxnSpPr>
           <p:nvPr/>
         </p:nvCxnSpPr>
         <p:spPr>
-          <a:xfrm>
-            <a:off x="3886200" y="2286001"/>
-            <a:ext cx="4608000" cy="1"/>
+          <a:xfrm flipV="1">
+            <a:off x="3957953" y="1938758"/>
+            <a:ext cx="4582394" cy="7804"/>
           </a:xfrm>
           <a:prstGeom prst="straightConnector1">
             <a:avLst/>
@@ -6113,14 +6158,20 @@
       </p:cxnSp>
       <p:sp>
         <p:nvSpPr>
-          <p:cNvPr id="76" name="TextBox 75"/>
+          <p:cNvPr id="91" name="TextBox 90">
+            <a:extLst>
+              <a:ext uri="{FF2B5EF4-FFF2-40B4-BE49-F238E27FC236}">
+                <a16:creationId xmlns:a16="http://schemas.microsoft.com/office/drawing/2014/main" id="{FC8B7EBA-ED0A-F94C-9508-4630D739E910}"/>
+              </a:ext>
+            </a:extLst>
+          </p:cNvPr>
           <p:cNvSpPr txBox="1"/>
           <p:nvPr/>
         </p:nvSpPr>
         <p:spPr>
           <a:xfrm>
-            <a:off x="6162198" y="2070556"/>
-            <a:ext cx="1076802" cy="215444"/>
+            <a:off x="6017474" y="1752600"/>
+            <a:ext cx="2438400" cy="184666"/>
           </a:xfrm>
           <a:prstGeom prst="rect">
             <a:avLst/>
@@ -6134,35 +6185,86 @@
           <a:lstStyle/>
           <a:p>
             <a:r>
-              <a:rPr lang="en-US" sz="1400" dirty="0" err="1" smtClean="0">
+              <a:rPr lang="en-US" sz="1200" dirty="0">
                 <a:solidFill>
                   <a:schemeClr val="accent5">
                     <a:lumMod val="75000"/>
                   </a:schemeClr>
                 </a:solidFill>
               </a:rPr>
-              <a:t>getSchedule</a:t>
-            </a:r>
-            <a:r>
-              <a:rPr lang="en-US" sz="1400" dirty="0" smtClean="0">
+              <a:t>post(</a:t>
+            </a:r>
+            <a:r>
+              <a:rPr lang="en-US" sz="1200" dirty="0" err="1">
                 <a:solidFill>
                   <a:schemeClr val="accent5">
                     <a:lumMod val="75000"/>
                   </a:schemeClr>
                 </a:solidFill>
               </a:rPr>
-              <a:t>()</a:t>
-            </a:r>
-            <a:endParaRPr lang="en-US" sz="1400" dirty="0">
-              <a:solidFill>
-                <a:schemeClr val="accent5">
-                  <a:lumMod val="75000"/>
-                </a:schemeClr>
-              </a:solidFill>
-            </a:endParaRPr>
-          </a:p>
-        </p:txBody>
-      </p:sp>
+              <a:t>MainWindowClearResourceEvent</a:t>
+            </a:r>
+            <a:r>
+              <a:rPr lang="en-US" sz="1200" dirty="0">
+                <a:solidFill>
+                  <a:schemeClr val="accent5">
+                    <a:lumMod val="75000"/>
+                  </a:schemeClr>
+                </a:solidFill>
+              </a:rPr>
+              <a:t>)</a:t>
+            </a:r>
+          </a:p>
+        </p:txBody>
+      </p:sp>
+      <p:cxnSp>
+        <p:nvCxnSpPr>
+          <p:cNvPr id="92" name="Straight Arrow Connector 91">
+            <a:extLst>
+              <a:ext uri="{FF2B5EF4-FFF2-40B4-BE49-F238E27FC236}">
+                <a16:creationId xmlns:a16="http://schemas.microsoft.com/office/drawing/2014/main" id="{A059D5A3-B90E-3245-AC40-EC101B749CEA}"/>
+              </a:ext>
+            </a:extLst>
+          </p:cNvPr>
+          <p:cNvCxnSpPr>
+            <a:cxnSpLocks/>
+          </p:cNvCxnSpPr>
+          <p:nvPr/>
+        </p:nvCxnSpPr>
+        <p:spPr>
+          <a:xfrm>
+            <a:off x="3962400" y="2084245"/>
+            <a:ext cx="4582394" cy="0"/>
+          </a:xfrm>
+          <a:prstGeom prst="straightConnector1">
+            <a:avLst/>
+          </a:prstGeom>
+          <a:ln w="19050">
+            <a:solidFill>
+              <a:schemeClr val="accent5">
+                <a:lumMod val="75000"/>
+              </a:schemeClr>
+            </a:solidFill>
+            <a:prstDash val="sysDash"/>
+            <a:headEnd type="arrow" w="med" len="med"/>
+            <a:tailEnd type="none" w="med" len="med"/>
+          </a:ln>
+        </p:spPr>
+        <p:style>
+          <a:lnRef idx="1">
+            <a:schemeClr val="accent1"/>
+          </a:lnRef>
+          <a:fillRef idx="0">
+            <a:schemeClr val="accent1"/>
+          </a:fillRef>
+          <a:effectRef idx="0">
+            <a:schemeClr val="accent1"/>
+          </a:effectRef>
+          <a:fontRef idx="minor">
+            <a:schemeClr val="tx1"/>
+          </a:fontRef>
+        </p:style>
+      </p:cxnSp>
     </p:spTree>
     <p:extLst>
       <p:ext uri="{BB962C8B-B14F-4D97-AF65-F5344CB8AC3E}">

</xml_diff>